<commit_message>
added type-specific corruptor section
</commit_message>
<xml_diff>
--- a/talk/spiffy_talk.pptx
+++ b/talk/spiffy_talk.pptx
@@ -5,7 +5,7 @@
     <p:sldMasterId id="2147483660" r:id="rId1"/>
   </p:sldMasterIdLst>
   <p:notesMasterIdLst>
-    <p:notesMasterId r:id="rId38"/>
+    <p:notesMasterId r:id="rId41"/>
   </p:notesMasterIdLst>
   <p:sldIdLst>
     <p:sldId id="256" r:id="rId2"/>
@@ -37,13 +37,16 @@
     <p:sldId id="312" r:id="rId28"/>
     <p:sldId id="267" r:id="rId29"/>
     <p:sldId id="323" r:id="rId30"/>
-    <p:sldId id="279" r:id="rId31"/>
-    <p:sldId id="280" r:id="rId32"/>
-    <p:sldId id="281" r:id="rId33"/>
-    <p:sldId id="258" r:id="rId34"/>
-    <p:sldId id="259" r:id="rId35"/>
-    <p:sldId id="261" r:id="rId36"/>
-    <p:sldId id="260" r:id="rId37"/>
+    <p:sldId id="324" r:id="rId31"/>
+    <p:sldId id="325" r:id="rId32"/>
+    <p:sldId id="326" r:id="rId33"/>
+    <p:sldId id="279" r:id="rId34"/>
+    <p:sldId id="280" r:id="rId35"/>
+    <p:sldId id="281" r:id="rId36"/>
+    <p:sldId id="258" r:id="rId37"/>
+    <p:sldId id="259" r:id="rId38"/>
+    <p:sldId id="261" r:id="rId39"/>
+    <p:sldId id="260" r:id="rId40"/>
   </p:sldIdLst>
   <p:sldSz cx="12192000" cy="6858000"/>
   <p:notesSz cx="6858000" cy="9144000"/>
@@ -439,11 +442,11 @@
         </c:dLbls>
         <c:marker val="1"/>
         <c:smooth val="0"/>
-        <c:axId val="579500816"/>
-        <c:axId val="579506256"/>
+        <c:axId val="1060318176"/>
+        <c:axId val="1060318720"/>
       </c:lineChart>
       <c:catAx>
-        <c:axId val="579500816"/>
+        <c:axId val="1060318176"/>
         <c:scaling>
           <c:orientation val="minMax"/>
         </c:scaling>
@@ -544,7 +547,7 @@
             <a:endParaRPr lang="en-US"/>
           </a:p>
         </c:txPr>
-        <c:crossAx val="579506256"/>
+        <c:crossAx val="1060318720"/>
         <c:crosses val="autoZero"/>
         <c:auto val="0"/>
         <c:lblAlgn val="ctr"/>
@@ -552,7 +555,7 @@
         <c:noMultiLvlLbl val="0"/>
       </c:catAx>
       <c:valAx>
-        <c:axId val="579506256"/>
+        <c:axId val="1060318720"/>
         <c:scaling>
           <c:logBase val="4"/>
           <c:orientation val="minMax"/>
@@ -649,7 +652,7 @@
             <a:endParaRPr lang="en-US"/>
           </a:p>
         </c:txPr>
-        <c:crossAx val="579500816"/>
+        <c:crossAx val="1060318176"/>
         <c:crosses val="autoZero"/>
         <c:crossBetween val="between"/>
       </c:valAx>
@@ -1088,11 +1091,11 @@
         </c:dLbls>
         <c:gapWidth val="20"/>
         <c:overlap val="100"/>
-        <c:axId val="579495920"/>
-        <c:axId val="579495376"/>
+        <c:axId val="1060312736"/>
+        <c:axId val="1060317632"/>
       </c:barChart>
       <c:catAx>
-        <c:axId val="579495920"/>
+        <c:axId val="1060312736"/>
         <c:scaling>
           <c:orientation val="minMax"/>
         </c:scaling>
@@ -1129,7 +1132,7 @@
             <a:endParaRPr lang="en-US"/>
           </a:p>
         </c:txPr>
-        <c:crossAx val="579495376"/>
+        <c:crossAx val="1060317632"/>
         <c:crosses val="autoZero"/>
         <c:auto val="1"/>
         <c:lblAlgn val="ctr"/>
@@ -1137,7 +1140,7 @@
         <c:noMultiLvlLbl val="1"/>
       </c:catAx>
       <c:valAx>
-        <c:axId val="579495376"/>
+        <c:axId val="1060317632"/>
         <c:scaling>
           <c:orientation val="minMax"/>
           <c:max val="3000"/>
@@ -1178,7 +1181,6 @@
               </a:p>
             </c:rich>
           </c:tx>
-          <c:layout/>
           <c:overlay val="0"/>
           <c:spPr>
             <a:noFill/>
@@ -1235,7 +1237,7 @@
             <a:endParaRPr lang="en-US"/>
           </a:p>
         </c:txPr>
-        <c:crossAx val="579495920"/>
+        <c:crossAx val="1060312736"/>
         <c:crosses val="autoZero"/>
         <c:crossBetween val="between"/>
         <c:majorUnit val="1000"/>
@@ -4882,7 +4884,7 @@
           <a:p>
             <a:fld id="{849A0A36-F84D-437B-B821-CB3EBADC1433}" type="slidenum">
               <a:rPr lang="en-CA" smtClean="0"/>
-              <a:t>30</a:t>
+              <a:t>33</a:t>
             </a:fld>
             <a:endParaRPr lang="en-CA"/>
           </a:p>
@@ -4974,7 +4976,7 @@
           <a:p>
             <a:fld id="{849A0A36-F84D-437B-B821-CB3EBADC1433}" type="slidenum">
               <a:rPr lang="en-CA" smtClean="0"/>
-              <a:t>31</a:t>
+              <a:t>34</a:t>
             </a:fld>
             <a:endParaRPr lang="en-CA"/>
           </a:p>
@@ -5066,7 +5068,7 @@
           <a:p>
             <a:fld id="{849A0A36-F84D-437B-B821-CB3EBADC1433}" type="slidenum">
               <a:rPr lang="en-CA" smtClean="0"/>
-              <a:t>32</a:t>
+              <a:t>35</a:t>
             </a:fld>
             <a:endParaRPr lang="en-CA"/>
           </a:p>
@@ -5174,7 +5176,7 @@
           <a:p>
             <a:fld id="{B5B5BF96-4013-477F-9949-176AD53AFF60}" type="slidenum">
               <a:rPr lang="en-CA" smtClean="0"/>
-              <a:t>33</a:t>
+              <a:t>36</a:t>
             </a:fld>
             <a:endParaRPr lang="en-CA"/>
           </a:p>
@@ -5422,7 +5424,7 @@
           <a:p>
             <a:fld id="{849A0A36-F84D-437B-B821-CB3EBADC1433}" type="slidenum">
               <a:rPr lang="en-CA" smtClean="0"/>
-              <a:t>34</a:t>
+              <a:t>37</a:t>
             </a:fld>
             <a:endParaRPr lang="en-CA"/>
           </a:p>
@@ -5518,7 +5520,7 @@
           <a:p>
             <a:fld id="{849A0A36-F84D-437B-B821-CB3EBADC1433}" type="slidenum">
               <a:rPr lang="en-CA" smtClean="0"/>
-              <a:t>35</a:t>
+              <a:t>38</a:t>
             </a:fld>
             <a:endParaRPr lang="en-CA"/>
           </a:p>
@@ -14900,11 +14902,7 @@
             </a:br>
             <a:r>
               <a:rPr lang="en-CA" dirty="0" smtClean="0"/>
-              <a:t>logical </a:t>
-            </a:r>
-            <a:r>
-              <a:rPr lang="en-CA" dirty="0" smtClean="0"/>
-              <a:t>addresses</a:t>
+              <a:t>logical addresses</a:t>
             </a:r>
           </a:p>
           <a:p>
@@ -23297,15 +23295,7 @@
                       <a:schemeClr val="bg1"/>
                     </a:solidFill>
                   </a:rPr>
-                  <a:t>data </a:t>
-                </a:r>
-                <a:r>
-                  <a:rPr lang="en-US" sz="1600" dirty="0" smtClean="0">
-                    <a:solidFill>
-                      <a:schemeClr val="bg1"/>
-                    </a:solidFill>
-                  </a:rPr>
-                  <a:t>block</a:t>
+                  <a:t>data block</a:t>
                 </a:r>
                 <a:endParaRPr lang="en-US" sz="1600" dirty="0">
                   <a:solidFill>
@@ -24517,27 +24507,7 @@
           <a:p>
             <a:r>
               <a:rPr lang="en-CA" dirty="0" smtClean="0"/>
-              <a:t>LOC </a:t>
-            </a:r>
-            <a:r>
-              <a:rPr lang="en-CA" dirty="0" smtClean="0"/>
-              <a:t>required </a:t>
-            </a:r>
-            <a:r>
-              <a:rPr lang="en-CA" dirty="0" smtClean="0"/>
-              <a:t>to </a:t>
-            </a:r>
-            <a:r>
-              <a:rPr lang="en-CA" dirty="0" smtClean="0"/>
-              <a:t>correctly annotate </a:t>
-            </a:r>
-            <a:r>
-              <a:rPr lang="en-CA" dirty="0" smtClean="0"/>
-              <a:t>modern </a:t>
-            </a:r>
-            <a:r>
-              <a:rPr lang="en-CA" dirty="0" smtClean="0"/>
-              <a:t>file systems</a:t>
+              <a:t>LOC required to correctly annotate modern file systems</a:t>
             </a:r>
           </a:p>
           <a:p>
@@ -24558,13 +24528,8 @@
             <a:pPr lvl="1"/>
             <a:r>
               <a:rPr lang="en-CA" dirty="0" smtClean="0"/>
-              <a:t>Some structures need to be </a:t>
-            </a:r>
-            <a:r>
-              <a:rPr lang="en-CA" dirty="0" smtClean="0"/>
-              <a:t>changed</a:t>
-            </a:r>
-            <a:endParaRPr lang="en-CA" dirty="0" smtClean="0"/>
+              <a:t>Some structures need to be changed</a:t>
+            </a:r>
           </a:p>
           <a:p>
             <a:pPr lvl="2"/>
@@ -24578,11 +24543,7 @@
             </a:r>
             <a:r>
               <a:rPr lang="en-CA" dirty="0" smtClean="0"/>
-              <a:t> </a:t>
-            </a:r>
-            <a:r>
-              <a:rPr lang="en-CA" dirty="0" smtClean="0"/>
-              <a:t>is an array of pointers, but the last 3 are indirect pointers of different level</a:t>
+              <a:t> is an array of pointers, but the last 3 are indirect pointers of different level</a:t>
             </a:r>
           </a:p>
           <a:p>
@@ -24650,21 +24611,21 @@
                 <a:gridCol w="2119866">
                   <a:extLst>
                     <a:ext uri="{9D8B030D-6E8A-4147-A177-3AD203B41FA5}">
-                      <a16:colId xmlns:a16="http://schemas.microsoft.com/office/drawing/2014/main" xmlns="" val="20000"/>
+                      <a16:colId xmlns="" xmlns:a16="http://schemas.microsoft.com/office/drawing/2014/main" val="20000"/>
                     </a:ext>
                   </a:extLst>
                 </a:gridCol>
                 <a:gridCol w="2119866">
                   <a:extLst>
                     <a:ext uri="{9D8B030D-6E8A-4147-A177-3AD203B41FA5}">
-                      <a16:colId xmlns:a16="http://schemas.microsoft.com/office/drawing/2014/main" xmlns="" val="20001"/>
+                      <a16:colId xmlns="" xmlns:a16="http://schemas.microsoft.com/office/drawing/2014/main" val="20001"/>
                     </a:ext>
                   </a:extLst>
                 </a:gridCol>
                 <a:gridCol w="2119866">
                   <a:extLst>
                     <a:ext uri="{9D8B030D-6E8A-4147-A177-3AD203B41FA5}">
-                      <a16:colId xmlns:a16="http://schemas.microsoft.com/office/drawing/2014/main" xmlns="" val="20002"/>
+                      <a16:colId xmlns="" xmlns:a16="http://schemas.microsoft.com/office/drawing/2014/main" val="20002"/>
                     </a:ext>
                   </a:extLst>
                 </a:gridCol>
@@ -24738,7 +24699,7 @@
                 </a:tc>
                 <a:extLst>
                   <a:ext uri="{0D108BD9-81ED-4DB2-BD59-A6C34878D82A}">
-                    <a16:rowId xmlns:a16="http://schemas.microsoft.com/office/drawing/2014/main" xmlns="" val="10000"/>
+                    <a16:rowId xmlns="" xmlns:a16="http://schemas.microsoft.com/office/drawing/2014/main" val="10000"/>
                   </a:ext>
                 </a:extLst>
               </a:tr>
@@ -24811,7 +24772,7 @@
                 </a:tc>
                 <a:extLst>
                   <a:ext uri="{0D108BD9-81ED-4DB2-BD59-A6C34878D82A}">
-                    <a16:rowId xmlns:a16="http://schemas.microsoft.com/office/drawing/2014/main" xmlns="" val="10001"/>
+                    <a16:rowId xmlns="" xmlns:a16="http://schemas.microsoft.com/office/drawing/2014/main" val="10001"/>
                   </a:ext>
                 </a:extLst>
               </a:tr>
@@ -24884,7 +24845,7 @@
                 </a:tc>
                 <a:extLst>
                   <a:ext uri="{0D108BD9-81ED-4DB2-BD59-A6C34878D82A}">
-                    <a16:rowId xmlns:a16="http://schemas.microsoft.com/office/drawing/2014/main" xmlns="" val="10002"/>
+                    <a16:rowId xmlns="" xmlns:a16="http://schemas.microsoft.com/office/drawing/2014/main" val="10002"/>
                   </a:ext>
                 </a:extLst>
               </a:tr>
@@ -24957,7 +24918,7 @@
                 </a:tc>
                 <a:extLst>
                   <a:ext uri="{0D108BD9-81ED-4DB2-BD59-A6C34878D82A}">
-                    <a16:rowId xmlns:a16="http://schemas.microsoft.com/office/drawing/2014/main" xmlns="" val="10003"/>
+                    <a16:rowId xmlns="" xmlns:a16="http://schemas.microsoft.com/office/drawing/2014/main" val="10003"/>
                   </a:ext>
                 </a:extLst>
               </a:tr>
@@ -30737,13 +30698,8 @@
           <a:p>
             <a:r>
               <a:rPr lang="en-CA" dirty="0" smtClean="0"/>
-              <a:t>Using Spiffy </a:t>
-            </a:r>
-            <a:r>
-              <a:rPr lang="en-CA" dirty="0" smtClean="0"/>
-              <a:t>Library</a:t>
-            </a:r>
-            <a:endParaRPr lang="en-CA" dirty="0" smtClean="0"/>
+              <a:t>Using Spiffy Library</a:t>
+            </a:r>
           </a:p>
         </p:txBody>
       </p:sp>
@@ -32109,11 +32065,7 @@
           <a:p>
             <a:r>
               <a:rPr lang="en-CA" dirty="0" smtClean="0"/>
-              <a:t>Using Spiffy </a:t>
-            </a:r>
-            <a:r>
-              <a:rPr lang="en-CA" dirty="0" smtClean="0"/>
-              <a:t>Library</a:t>
+              <a:t>Using Spiffy Library</a:t>
             </a:r>
           </a:p>
           <a:p>
@@ -32142,7 +32094,6 @@
               <a:rPr lang="en-CA" dirty="0" smtClean="0"/>
               <a:t>Only need to write file-system specific code to process block allocation metadata</a:t>
             </a:r>
-            <a:endParaRPr lang="en-CA" dirty="0" smtClean="0"/>
           </a:p>
           <a:p>
             <a:pPr lvl="1"/>
@@ -32481,14 +32432,7 @@
                 <a:latin typeface="Courier New" panose="02070309020205020404" pitchFamily="49" charset="0"/>
                 <a:cs typeface="Courier New" panose="02070309020205020404" pitchFamily="49" charset="0"/>
               </a:rPr>
-              <a:t>(vector&lt;Extent</a:t>
-            </a:r>
-            <a:r>
-              <a:rPr lang="en-CA" sz="1600" dirty="0" smtClean="0">
-                <a:latin typeface="Courier New" panose="02070309020205020404" pitchFamily="49" charset="0"/>
-                <a:cs typeface="Courier New" panose="02070309020205020404" pitchFamily="49" charset="0"/>
-              </a:rPr>
-              <a:t>&gt; &amp; </a:t>
+              <a:t>(vector&lt;Extent&gt; &amp; </a:t>
             </a:r>
             <a:r>
               <a:rPr lang="en-CA" sz="1600" dirty="0" err="1" smtClean="0">
@@ -32558,14 +32502,7 @@
                 <a:latin typeface="Courier New" panose="02070309020205020404" pitchFamily="49" charset="0"/>
                 <a:cs typeface="Courier New" panose="02070309020205020404" pitchFamily="49" charset="0"/>
               </a:rPr>
-              <a:t>(dev</a:t>
-            </a:r>
-            <a:r>
-              <a:rPr lang="en-CA" sz="1600" dirty="0" smtClean="0">
-                <a:latin typeface="Courier New" panose="02070309020205020404" pitchFamily="49" charset="0"/>
-                <a:cs typeface="Courier New" panose="02070309020205020404" pitchFamily="49" charset="0"/>
-              </a:rPr>
-              <a:t>);</a:t>
+              <a:t>(dev);</a:t>
             </a:r>
           </a:p>
           <a:p>
@@ -32967,14 +32904,7 @@
                 <a:latin typeface="Courier New" panose="02070309020205020404" pitchFamily="49" charset="0"/>
                 <a:cs typeface="Courier New" panose="02070309020205020404" pitchFamily="49" charset="0"/>
               </a:rPr>
-              <a:t>, </a:t>
-            </a:r>
-            <a:r>
-              <a:rPr lang="en-CA" sz="1600" dirty="0" smtClean="0">
-                <a:latin typeface="Courier New" panose="02070309020205020404" pitchFamily="49" charset="0"/>
-                <a:cs typeface="Courier New" panose="02070309020205020404" pitchFamily="49" charset="0"/>
-              </a:rPr>
-              <a:t>&amp;</a:t>
+              <a:t>, &amp;</a:t>
             </a:r>
             <a:r>
               <a:rPr lang="en-CA" sz="1600" dirty="0" err="1" smtClean="0">
@@ -33258,8 +33188,8 @@
           <a:lstStyle/>
           <a:p>
             <a:r>
-              <a:rPr lang="en-CA" smtClean="0"/>
-              <a:t>Offline Spiffy Applications</a:t>
+              <a:rPr lang="en-CA" dirty="0" smtClean="0"/>
+              <a:t>Type-Specific Corruptor</a:t>
             </a:r>
             <a:endParaRPr lang="en-CA" dirty="0"/>
           </a:p>
@@ -33281,72 +33211,69 @@
           <a:lstStyle/>
           <a:p>
             <a:r>
-              <a:rPr lang="en-CA" smtClean="0"/>
-              <a:t>Have exclusive access to file system image</a:t>
-            </a:r>
-          </a:p>
-          <a:p>
-            <a:r>
-              <a:rPr lang="en-CA" smtClean="0"/>
-              <a:t>File System Dump Tool</a:t>
+              <a:rPr lang="en-CA" dirty="0"/>
+              <a:t>Finds and corrupts a field in a specified </a:t>
+            </a:r>
+            <a:r>
+              <a:rPr lang="en-CA" dirty="0" smtClean="0"/>
+              <a:t>structure</a:t>
+            </a:r>
+            <a:endParaRPr lang="en-CA" dirty="0"/>
+          </a:p>
+          <a:p>
+            <a:r>
+              <a:rPr lang="en-CA" dirty="0" smtClean="0"/>
+              <a:t>Works for all annotated file systems</a:t>
             </a:r>
           </a:p>
           <a:p>
             <a:pPr lvl="1"/>
             <a:r>
-              <a:rPr lang="en-CA" smtClean="0"/>
-              <a:t>Prints out all metadata in a file system</a:t>
-            </a:r>
-          </a:p>
-          <a:p>
-            <a:r>
-              <a:rPr lang="en-CA" smtClean="0"/>
-              <a:t>Type-Specific File System Corruptor</a:t>
+              <a:rPr lang="en-CA" dirty="0" smtClean="0"/>
+              <a:t>Small bootstrap code is required to initialize library</a:t>
             </a:r>
           </a:p>
           <a:p>
             <a:pPr lvl="1"/>
             <a:r>
-              <a:rPr lang="en-CA" smtClean="0"/>
-              <a:t>Finds and corrupts a field in a specified structure</a:t>
-            </a:r>
-          </a:p>
-          <a:p>
-            <a:r>
-              <a:rPr lang="en-CA" smtClean="0"/>
-              <a:t>File System Conversion Tool</a:t>
-            </a:r>
+              <a:rPr lang="en-CA" dirty="0" smtClean="0"/>
+              <a:t>Generic Application Code: 455 LOC</a:t>
+            </a:r>
+            <a:endParaRPr lang="en-CA" dirty="0"/>
           </a:p>
           <a:p>
             <a:pPr lvl="1"/>
             <a:r>
-              <a:rPr lang="en-CA" smtClean="0"/>
-              <a:t>Converts from one file system to another</a:t>
+              <a:rPr lang="en-CA" dirty="0" smtClean="0"/>
+              <a:t>File-System Specific Code: &lt; 30 LOC each</a:t>
+            </a:r>
+          </a:p>
+          <a:p>
+            <a:r>
+              <a:rPr lang="en-CA" dirty="0" smtClean="0"/>
+              <a:t>Corruption Experiment</a:t>
             </a:r>
           </a:p>
           <a:p>
             <a:pPr lvl="1"/>
             <a:r>
-              <a:rPr lang="en-CA" smtClean="0"/>
-              <a:t>minimizes moving of data blocks</a:t>
+              <a:rPr lang="en-CA" dirty="0" smtClean="0"/>
+              <a:t>Ran existing tools on corrupt file system image</a:t>
             </a:r>
           </a:p>
           <a:p>
             <a:pPr lvl="1"/>
             <a:r>
-              <a:rPr lang="en-CA" smtClean="0"/>
-              <a:t>Faster than copying to a difference device, reformat, and copy back	</a:t>
-            </a:r>
-          </a:p>
-          <a:p>
-            <a:pPr lvl="1"/>
+              <a:rPr lang="en-CA" dirty="0" smtClean="0"/>
+              <a:t>Discovered crash bugs in dumpe2fs (Ext4) and dump.f2fs (F2FS)</a:t>
+            </a:r>
             <a:endParaRPr lang="en-CA" dirty="0"/>
           </a:p>
         </p:txBody>
       </p:sp>
       <p:sp>
         <p:nvSpPr>
-          <p:cNvPr id="5" name="Slide Number Placeholder 4"/>
+          <p:cNvPr id="4" name="Slide Number Placeholder 3"/>
           <p:cNvSpPr>
             <a:spLocks noGrp="1"/>
           </p:cNvSpPr>
@@ -33371,20 +33298,13 @@
     </p:spTree>
     <p:extLst>
       <p:ext uri="{BB962C8B-B14F-4D97-AF65-F5344CB8AC3E}">
-        <p14:creationId xmlns:p14="http://schemas.microsoft.com/office/powerpoint/2010/main" val="1364355086"/>
+        <p14:creationId xmlns:p14="http://schemas.microsoft.com/office/powerpoint/2010/main" val="1921927365"/>
       </p:ext>
     </p:extLst>
   </p:cSld>
   <p:clrMapOvr>
     <a:masterClrMapping/>
   </p:clrMapOvr>
-  <p:timing>
-    <p:tnLst>
-      <p:par>
-        <p:cTn id="1" dur="indefinite" restart="never" nodeType="tmRoot"/>
-      </p:par>
-    </p:tnLst>
-  </p:timing>
 </p:sld>
 </file>
 
@@ -33421,8 +33341,8 @@
           <a:lstStyle/>
           <a:p>
             <a:r>
-              <a:rPr lang="en-CA" smtClean="0"/>
-              <a:t>Online Applications</a:t>
+              <a:rPr lang="en-CA" dirty="0" smtClean="0"/>
+              <a:t>File System Conversion Tool</a:t>
             </a:r>
             <a:endParaRPr lang="en-CA" dirty="0"/>
           </a:p>
@@ -33443,87 +33363,13 @@
           <a:bodyPr/>
           <a:lstStyle/>
           <a:p>
-            <a:r>
-              <a:rPr lang="en-CA" smtClean="0"/>
-              <a:t>Operates while file system is in-use</a:t>
-            </a:r>
-          </a:p>
-          <a:p>
-            <a:r>
-              <a:rPr lang="en-CA" smtClean="0"/>
-              <a:t>Differentiated Storage Service</a:t>
-            </a:r>
-          </a:p>
-          <a:p>
-            <a:pPr lvl="1"/>
-            <a:r>
-              <a:rPr lang="en-CA" smtClean="0"/>
-              <a:t>Prioritize metadata and small files</a:t>
-            </a:r>
-          </a:p>
-          <a:p>
-            <a:pPr lvl="1"/>
-            <a:r>
-              <a:rPr lang="en-CA" smtClean="0"/>
-              <a:t>Difficult to implement</a:t>
-            </a:r>
-          </a:p>
-          <a:p>
-            <a:pPr lvl="1"/>
-            <a:r>
-              <a:rPr lang="en-CA" smtClean="0"/>
-              <a:t>Requires file system to provide hints to block layer</a:t>
-            </a:r>
-          </a:p>
-          <a:p>
-            <a:r>
-              <a:rPr lang="en-CA" smtClean="0"/>
-              <a:t>Runtime Interpretation</a:t>
-            </a:r>
-          </a:p>
-          <a:p>
-            <a:pPr lvl="1"/>
-            <a:r>
-              <a:rPr lang="en-CA" smtClean="0"/>
-              <a:t>Classifies file system IO at the block layer</a:t>
-            </a:r>
-          </a:p>
-          <a:p>
-            <a:pPr lvl="1"/>
-            <a:r>
-              <a:rPr lang="en-CA" smtClean="0"/>
-              <a:t>Requires no modification to file system</a:t>
-            </a:r>
-          </a:p>
-          <a:p>
-            <a:pPr lvl="1"/>
-            <a:r>
-              <a:rPr lang="en-CA" smtClean="0"/>
-              <a:t>Requires little file-system specific code</a:t>
-            </a:r>
-          </a:p>
-          <a:p>
-            <a:r>
-              <a:rPr lang="en-CA" smtClean="0"/>
-              <a:t>Spiffy Block Layer Cache</a:t>
-            </a:r>
-          </a:p>
-          <a:p>
-            <a:pPr lvl="1"/>
-            <a:r>
-              <a:rPr lang="en-CA" smtClean="0"/>
-              <a:t>Preferentially caches files belonging to priority users</a:t>
-            </a:r>
-          </a:p>
-          <a:p>
-            <a:pPr lvl="1"/>
-            <a:endParaRPr lang="en-CA" dirty="0"/>
+            <a:endParaRPr lang="en-CA"/>
           </a:p>
         </p:txBody>
       </p:sp>
       <p:sp>
         <p:nvSpPr>
-          <p:cNvPr id="5" name="Slide Number Placeholder 4"/>
+          <p:cNvPr id="4" name="Slide Number Placeholder 3"/>
           <p:cNvSpPr>
             <a:spLocks noGrp="1"/>
           </p:cNvSpPr>
@@ -33548,20 +33394,13 @@
     </p:spTree>
     <p:extLst>
       <p:ext uri="{BB962C8B-B14F-4D97-AF65-F5344CB8AC3E}">
-        <p14:creationId xmlns:p14="http://schemas.microsoft.com/office/powerpoint/2010/main" val="2815511303"/>
+        <p14:creationId xmlns:p14="http://schemas.microsoft.com/office/powerpoint/2010/main" val="1177832070"/>
       </p:ext>
     </p:extLst>
   </p:cSld>
   <p:clrMapOvr>
     <a:masterClrMapping/>
   </p:clrMapOvr>
-  <p:timing>
-    <p:tnLst>
-      <p:par>
-        <p:cTn id="1" dur="indefinite" restart="never" nodeType="tmRoot"/>
-      </p:par>
-    </p:tnLst>
-  </p:timing>
 </p:sld>
 </file>
 
@@ -33598,8 +33437,8 @@
           <a:lstStyle/>
           <a:p>
             <a:r>
-              <a:rPr lang="en-CA" smtClean="0"/>
-              <a:t>Evaluation: Ext4 to F2FS Converter</a:t>
+              <a:rPr lang="en-CA" dirty="0" smtClean="0"/>
+              <a:t>Spiffy Block Layer Cache</a:t>
             </a:r>
             <a:endParaRPr lang="en-CA" dirty="0"/>
           </a:p>
@@ -33620,58 +33459,13 @@
           <a:bodyPr/>
           <a:lstStyle/>
           <a:p>
-            <a:r>
-              <a:rPr lang="en-CA" smtClean="0"/>
-              <a:t>Converts 64GB file system with 16GB file set on SSD</a:t>
-            </a:r>
-          </a:p>
-          <a:p>
-            <a:pPr lvl="1"/>
-            <a:r>
-              <a:rPr lang="en-CA" smtClean="0"/>
-              <a:t>Copy converter copies data to local disk, reformat, then copies back</a:t>
-            </a:r>
-          </a:p>
-          <a:p>
-            <a:pPr lvl="1"/>
-            <a:r>
-              <a:rPr lang="en-CA" smtClean="0"/>
-              <a:t>Spiffy converter and Manual converter minimizes moving data blocks</a:t>
-            </a:r>
-          </a:p>
-          <a:p>
-            <a:endParaRPr lang="en-CA" smtClean="0"/>
-          </a:p>
-          <a:p>
-            <a:endParaRPr lang="en-CA" smtClean="0"/>
-          </a:p>
-          <a:p>
-            <a:endParaRPr lang="en-CA" smtClean="0"/>
-          </a:p>
-          <a:p>
-            <a:endParaRPr lang="en-CA" smtClean="0"/>
-          </a:p>
-          <a:p>
-            <a:endParaRPr lang="en-CA" smtClean="0"/>
-          </a:p>
-          <a:p>
-            <a:r>
-              <a:rPr lang="en-CA" smtClean="0"/>
-              <a:t>Copy converter 30~50 times slower</a:t>
-            </a:r>
-          </a:p>
-          <a:p>
-            <a:r>
-              <a:rPr lang="en-CA" smtClean="0"/>
-              <a:t>Overhead of using Spiffy at most 16.7%</a:t>
-            </a:r>
-            <a:endParaRPr lang="en-CA" dirty="0"/>
+            <a:endParaRPr lang="en-CA"/>
           </a:p>
         </p:txBody>
       </p:sp>
       <p:sp>
         <p:nvSpPr>
-          <p:cNvPr id="6" name="Slide Number Placeholder 5"/>
+          <p:cNvPr id="4" name="Slide Number Placeholder 3"/>
           <p:cNvSpPr>
             <a:spLocks noGrp="1"/>
           </p:cNvSpPr>
@@ -33693,47 +33487,16 @@
           </a:p>
         </p:txBody>
       </p:sp>
-      <p:graphicFrame>
-        <p:nvGraphicFramePr>
-          <p:cNvPr id="7" name="Chart 6"/>
-          <p:cNvGraphicFramePr>
-            <a:graphicFrameLocks/>
-          </p:cNvGraphicFramePr>
-          <p:nvPr>
-            <p:extLst>
-              <p:ext uri="{D42A27DB-BD31-4B8C-83A1-F6EECF244321}">
-                <p14:modId xmlns:p14="http://schemas.microsoft.com/office/powerpoint/2010/main" val="228874709"/>
-              </p:ext>
-            </p:extLst>
-          </p:nvPr>
-        </p:nvGraphicFramePr>
-        <p:xfrm>
-          <a:off x="1420739" y="1630018"/>
-          <a:ext cx="8167835" cy="4283420"/>
-        </p:xfrm>
-        <a:graphic>
-          <a:graphicData uri="http://schemas.openxmlformats.org/drawingml/2006/chart">
-            <c:chart xmlns:c="http://schemas.openxmlformats.org/drawingml/2006/chart" xmlns:r="http://schemas.openxmlformats.org/officeDocument/2006/relationships" r:id="rId3"/>
-          </a:graphicData>
-        </a:graphic>
-      </p:graphicFrame>
     </p:spTree>
     <p:extLst>
       <p:ext uri="{BB962C8B-B14F-4D97-AF65-F5344CB8AC3E}">
-        <p14:creationId xmlns:p14="http://schemas.microsoft.com/office/powerpoint/2010/main" val="1496817654"/>
+        <p14:creationId xmlns:p14="http://schemas.microsoft.com/office/powerpoint/2010/main" val="1540520279"/>
       </p:ext>
     </p:extLst>
   </p:cSld>
   <p:clrMapOvr>
     <a:masterClrMapping/>
   </p:clrMapOvr>
-  <p:timing>
-    <p:tnLst>
-      <p:par>
-        <p:cTn id="1" dur="indefinite" restart="never" nodeType="tmRoot"/>
-      </p:par>
-    </p:tnLst>
-  </p:timing>
 </p:sld>
 </file>
 
@@ -33771,7 +33534,7 @@
           <a:p>
             <a:r>
               <a:rPr lang="en-CA" smtClean="0"/>
-              <a:t>Conclusion</a:t>
+              <a:t>Offline Spiffy Applications</a:t>
             </a:r>
             <a:endParaRPr lang="en-CA" dirty="0"/>
           </a:p>
@@ -33793,77 +33556,72 @@
           <a:lstStyle/>
           <a:p>
             <a:r>
-              <a:rPr lang="en-CA" smtClean="0"/>
-              <a:t>Spiffy framework</a:t>
+              <a:rPr lang="en-CA" dirty="0" smtClean="0"/>
+              <a:t>Have exclusive access to file system image</a:t>
+            </a:r>
+          </a:p>
+          <a:p>
+            <a:r>
+              <a:rPr lang="en-CA" dirty="0" smtClean="0"/>
+              <a:t>File System Dump Tool</a:t>
             </a:r>
           </a:p>
           <a:p>
             <a:pPr lvl="1"/>
             <a:r>
-              <a:rPr lang="en-CA" smtClean="0"/>
-              <a:t>Annotation language for specifying file system format</a:t>
+              <a:rPr lang="en-CA" dirty="0" smtClean="0"/>
+              <a:t>Prints out all metadata in a file system</a:t>
+            </a:r>
+          </a:p>
+          <a:p>
+            <a:r>
+              <a:rPr lang="en-CA" dirty="0" smtClean="0"/>
+              <a:t>Type-Specific File System Corruptor</a:t>
             </a:r>
           </a:p>
           <a:p>
             <a:pPr lvl="1"/>
             <a:r>
-              <a:rPr lang="en-CA" smtClean="0"/>
-              <a:t>API for interpreting, and traversing file system metadata</a:t>
-            </a:r>
-          </a:p>
-          <a:p>
-            <a:pPr lvl="2"/>
-            <a:r>
-              <a:rPr lang="en-CA" smtClean="0"/>
-              <a:t>Simplifies development of file-system aware applications</a:t>
-            </a:r>
-          </a:p>
-          <a:p>
-            <a:pPr lvl="2"/>
-            <a:r>
-              <a:rPr lang="en-CA" smtClean="0"/>
-              <a:t>Reduces file-system specific code</a:t>
-            </a:r>
-          </a:p>
-          <a:p>
-            <a:pPr lvl="2"/>
-            <a:r>
-              <a:rPr lang="en-CA" smtClean="0"/>
-              <a:t>Enables code reuse across file systems</a:t>
+              <a:rPr lang="en-CA" dirty="0" smtClean="0"/>
+              <a:t>Finds and corrupts a field in a specified structure</a:t>
+            </a:r>
+          </a:p>
+          <a:p>
+            <a:r>
+              <a:rPr lang="en-CA" dirty="0" smtClean="0"/>
+              <a:t>File System Conversion Tool</a:t>
             </a:r>
           </a:p>
           <a:p>
             <a:pPr lvl="1"/>
             <a:r>
-              <a:rPr lang="en-CA" smtClean="0"/>
-              <a:t>Generated library from annotated data structures</a:t>
-            </a:r>
-          </a:p>
-          <a:p>
-            <a:pPr lvl="2"/>
-            <a:r>
-              <a:rPr lang="en-CA" smtClean="0"/>
-              <a:t>Robust against file system corruption</a:t>
-            </a:r>
-          </a:p>
-          <a:p>
-            <a:pPr lvl="2"/>
-            <a:r>
-              <a:rPr lang="en-CA" smtClean="0"/>
-              <a:t>Achieves good performance</a:t>
-            </a:r>
-          </a:p>
-          <a:p>
-            <a:endParaRPr lang="en-CA" smtClean="0"/>
-          </a:p>
-          <a:p>
+              <a:rPr lang="en-CA" dirty="0" smtClean="0"/>
+              <a:t>Converts from one file system to another</a:t>
+            </a:r>
+          </a:p>
+          <a:p>
+            <a:pPr lvl="1"/>
+            <a:r>
+              <a:rPr lang="en-CA" dirty="0" smtClean="0"/>
+              <a:t>minimizes moving of data blocks</a:t>
+            </a:r>
+          </a:p>
+          <a:p>
+            <a:pPr lvl="1"/>
+            <a:r>
+              <a:rPr lang="en-CA" dirty="0" smtClean="0"/>
+              <a:t>Faster than copying to a difference device, reformat, and copy back	</a:t>
+            </a:r>
+          </a:p>
+          <a:p>
+            <a:pPr lvl="1"/>
             <a:endParaRPr lang="en-CA" dirty="0"/>
           </a:p>
         </p:txBody>
       </p:sp>
       <p:sp>
         <p:nvSpPr>
-          <p:cNvPr id="4" name="Slide Number Placeholder 3"/>
+          <p:cNvPr id="5" name="Slide Number Placeholder 4"/>
           <p:cNvSpPr>
             <a:spLocks noGrp="1"/>
           </p:cNvSpPr>
@@ -33888,7 +33646,7 @@
     </p:spTree>
     <p:extLst>
       <p:ext uri="{BB962C8B-B14F-4D97-AF65-F5344CB8AC3E}">
-        <p14:creationId xmlns:p14="http://schemas.microsoft.com/office/powerpoint/2010/main" val="169057136"/>
+        <p14:creationId xmlns:p14="http://schemas.microsoft.com/office/powerpoint/2010/main" val="1364355086"/>
       </p:ext>
     </p:extLst>
   </p:cSld>
@@ -33939,7 +33697,7 @@
           <a:p>
             <a:r>
               <a:rPr lang="en-CA" smtClean="0"/>
-              <a:t>Evaluation: Programming Effort</a:t>
+              <a:t>Online Applications</a:t>
             </a:r>
             <a:endParaRPr lang="en-CA" dirty="0"/>
           </a:p>
@@ -33960,6 +33718,203 @@
           <a:bodyPr/>
           <a:lstStyle/>
           <a:p>
+            <a:r>
+              <a:rPr lang="en-CA" smtClean="0"/>
+              <a:t>Operates while file system is in-use</a:t>
+            </a:r>
+          </a:p>
+          <a:p>
+            <a:r>
+              <a:rPr lang="en-CA" smtClean="0"/>
+              <a:t>Differentiated Storage Service</a:t>
+            </a:r>
+          </a:p>
+          <a:p>
+            <a:pPr lvl="1"/>
+            <a:r>
+              <a:rPr lang="en-CA" smtClean="0"/>
+              <a:t>Prioritize metadata and small files</a:t>
+            </a:r>
+          </a:p>
+          <a:p>
+            <a:pPr lvl="1"/>
+            <a:r>
+              <a:rPr lang="en-CA" smtClean="0"/>
+              <a:t>Difficult to implement</a:t>
+            </a:r>
+          </a:p>
+          <a:p>
+            <a:pPr lvl="1"/>
+            <a:r>
+              <a:rPr lang="en-CA" smtClean="0"/>
+              <a:t>Requires file system to provide hints to block layer</a:t>
+            </a:r>
+          </a:p>
+          <a:p>
+            <a:r>
+              <a:rPr lang="en-CA" smtClean="0"/>
+              <a:t>Runtime Interpretation</a:t>
+            </a:r>
+          </a:p>
+          <a:p>
+            <a:pPr lvl="1"/>
+            <a:r>
+              <a:rPr lang="en-CA" smtClean="0"/>
+              <a:t>Classifies file system IO at the block layer</a:t>
+            </a:r>
+          </a:p>
+          <a:p>
+            <a:pPr lvl="1"/>
+            <a:r>
+              <a:rPr lang="en-CA" smtClean="0"/>
+              <a:t>Requires no modification to file system</a:t>
+            </a:r>
+          </a:p>
+          <a:p>
+            <a:pPr lvl="1"/>
+            <a:r>
+              <a:rPr lang="en-CA" smtClean="0"/>
+              <a:t>Requires little file-system specific code</a:t>
+            </a:r>
+          </a:p>
+          <a:p>
+            <a:r>
+              <a:rPr lang="en-CA" smtClean="0"/>
+              <a:t>Spiffy Block Layer Cache</a:t>
+            </a:r>
+          </a:p>
+          <a:p>
+            <a:pPr lvl="1"/>
+            <a:r>
+              <a:rPr lang="en-CA" smtClean="0"/>
+              <a:t>Preferentially caches files belonging to priority users</a:t>
+            </a:r>
+          </a:p>
+          <a:p>
+            <a:pPr lvl="1"/>
+            <a:endParaRPr lang="en-CA" dirty="0"/>
+          </a:p>
+        </p:txBody>
+      </p:sp>
+      <p:sp>
+        <p:nvSpPr>
+          <p:cNvPr id="5" name="Slide Number Placeholder 4"/>
+          <p:cNvSpPr>
+            <a:spLocks noGrp="1"/>
+          </p:cNvSpPr>
+          <p:nvPr>
+            <p:ph type="sldNum" sz="quarter" idx="12"/>
+          </p:nvPr>
+        </p:nvSpPr>
+        <p:spPr/>
+        <p:txBody>
+          <a:bodyPr/>
+          <a:lstStyle/>
+          <a:p>
+            <a:fld id="{7B2023C8-B124-43A9-8F92-0EEF5BAA9995}" type="slidenum">
+              <a:rPr lang="en-CA" smtClean="0"/>
+              <a:pPr/>
+              <a:t>34</a:t>
+            </a:fld>
+            <a:endParaRPr lang="en-CA" dirty="0"/>
+          </a:p>
+        </p:txBody>
+      </p:sp>
+    </p:spTree>
+    <p:extLst>
+      <p:ext uri="{BB962C8B-B14F-4D97-AF65-F5344CB8AC3E}">
+        <p14:creationId xmlns:p14="http://schemas.microsoft.com/office/powerpoint/2010/main" val="2815511303"/>
+      </p:ext>
+    </p:extLst>
+  </p:cSld>
+  <p:clrMapOvr>
+    <a:masterClrMapping/>
+  </p:clrMapOvr>
+  <p:timing>
+    <p:tnLst>
+      <p:par>
+        <p:cTn id="1" dur="indefinite" restart="never" nodeType="tmRoot"/>
+      </p:par>
+    </p:tnLst>
+  </p:timing>
+</p:sld>
+</file>
+
+<file path=ppt/slides/slide35.xml><?xml version="1.0" encoding="utf-8"?>
+<p:sld xmlns:a="http://schemas.openxmlformats.org/drawingml/2006/main" xmlns:r="http://schemas.openxmlformats.org/officeDocument/2006/relationships" xmlns:p="http://schemas.openxmlformats.org/presentationml/2006/main">
+  <p:cSld>
+    <p:spTree>
+      <p:nvGrpSpPr>
+        <p:cNvPr id="1" name=""/>
+        <p:cNvGrpSpPr/>
+        <p:nvPr/>
+      </p:nvGrpSpPr>
+      <p:grpSpPr>
+        <a:xfrm>
+          <a:off x="0" y="0"/>
+          <a:ext cx="0" cy="0"/>
+          <a:chOff x="0" y="0"/>
+          <a:chExt cx="0" cy="0"/>
+        </a:xfrm>
+      </p:grpSpPr>
+      <p:sp>
+        <p:nvSpPr>
+          <p:cNvPr id="2" name="Title 1"/>
+          <p:cNvSpPr>
+            <a:spLocks noGrp="1"/>
+          </p:cNvSpPr>
+          <p:nvPr>
+            <p:ph type="title"/>
+          </p:nvPr>
+        </p:nvSpPr>
+        <p:spPr/>
+        <p:txBody>
+          <a:bodyPr/>
+          <a:lstStyle/>
+          <a:p>
+            <a:r>
+              <a:rPr lang="en-CA" smtClean="0"/>
+              <a:t>Evaluation: Ext4 to F2FS Converter</a:t>
+            </a:r>
+            <a:endParaRPr lang="en-CA" dirty="0"/>
+          </a:p>
+        </p:txBody>
+      </p:sp>
+      <p:sp>
+        <p:nvSpPr>
+          <p:cNvPr id="3" name="Content Placeholder 2"/>
+          <p:cNvSpPr>
+            <a:spLocks noGrp="1"/>
+          </p:cNvSpPr>
+          <p:nvPr>
+            <p:ph idx="1"/>
+          </p:nvPr>
+        </p:nvSpPr>
+        <p:spPr/>
+        <p:txBody>
+          <a:bodyPr/>
+          <a:lstStyle/>
+          <a:p>
+            <a:r>
+              <a:rPr lang="en-CA" smtClean="0"/>
+              <a:t>Converts 64GB file system with 16GB file set on SSD</a:t>
+            </a:r>
+          </a:p>
+          <a:p>
+            <a:pPr lvl="1"/>
+            <a:r>
+              <a:rPr lang="en-CA" smtClean="0"/>
+              <a:t>Copy converter copies data to local disk, reformat, then copies back</a:t>
+            </a:r>
+          </a:p>
+          <a:p>
+            <a:pPr lvl="1"/>
+            <a:r>
+              <a:rPr lang="en-CA" smtClean="0"/>
+              <a:t>Spiffy converter and Manual converter minimizes moving data blocks</a:t>
+            </a:r>
+          </a:p>
+          <a:p>
             <a:endParaRPr lang="en-CA" smtClean="0"/>
           </a:p>
           <a:p>
@@ -33975,22 +33930,15 @@
             <a:endParaRPr lang="en-CA" smtClean="0"/>
           </a:p>
           <a:p>
-            <a:endParaRPr lang="en-CA" smtClean="0"/>
-          </a:p>
-          <a:p>
-            <a:endParaRPr lang="en-CA" smtClean="0"/>
-          </a:p>
-          <a:p>
             <a:r>
               <a:rPr lang="en-CA" smtClean="0"/>
-              <a:t>Programming effort reduced for read-only file system applications</a:t>
-            </a:r>
-          </a:p>
-          <a:p>
-            <a:pPr lvl="1"/>
+              <a:t>Copy converter 30~50 times slower</a:t>
+            </a:r>
+          </a:p>
+          <a:p>
             <a:r>
               <a:rPr lang="en-CA" smtClean="0"/>
-              <a:t>Both online and offline</a:t>
+              <a:t>Overhead of using Spiffy at most 16.7%</a:t>
             </a:r>
             <a:endParaRPr lang="en-CA" dirty="0"/>
           </a:p>
@@ -34014,7 +33962,334 @@
             <a:fld id="{7B2023C8-B124-43A9-8F92-0EEF5BAA9995}" type="slidenum">
               <a:rPr lang="en-CA" smtClean="0"/>
               <a:pPr/>
-              <a:t>34</a:t>
+              <a:t>35</a:t>
+            </a:fld>
+            <a:endParaRPr lang="en-CA" dirty="0"/>
+          </a:p>
+        </p:txBody>
+      </p:sp>
+      <p:graphicFrame>
+        <p:nvGraphicFramePr>
+          <p:cNvPr id="7" name="Chart 6"/>
+          <p:cNvGraphicFramePr>
+            <a:graphicFrameLocks/>
+          </p:cNvGraphicFramePr>
+          <p:nvPr>
+            <p:extLst>
+              <p:ext uri="{D42A27DB-BD31-4B8C-83A1-F6EECF244321}">
+                <p14:modId xmlns:p14="http://schemas.microsoft.com/office/powerpoint/2010/main" val="228874709"/>
+              </p:ext>
+            </p:extLst>
+          </p:nvPr>
+        </p:nvGraphicFramePr>
+        <p:xfrm>
+          <a:off x="1420739" y="1630018"/>
+          <a:ext cx="8167835" cy="4283420"/>
+        </p:xfrm>
+        <a:graphic>
+          <a:graphicData uri="http://schemas.openxmlformats.org/drawingml/2006/chart">
+            <c:chart xmlns:c="http://schemas.openxmlformats.org/drawingml/2006/chart" xmlns:r="http://schemas.openxmlformats.org/officeDocument/2006/relationships" r:id="rId3"/>
+          </a:graphicData>
+        </a:graphic>
+      </p:graphicFrame>
+    </p:spTree>
+    <p:extLst>
+      <p:ext uri="{BB962C8B-B14F-4D97-AF65-F5344CB8AC3E}">
+        <p14:creationId xmlns:p14="http://schemas.microsoft.com/office/powerpoint/2010/main" val="1496817654"/>
+      </p:ext>
+    </p:extLst>
+  </p:cSld>
+  <p:clrMapOvr>
+    <a:masterClrMapping/>
+  </p:clrMapOvr>
+  <p:timing>
+    <p:tnLst>
+      <p:par>
+        <p:cTn id="1" dur="indefinite" restart="never" nodeType="tmRoot"/>
+      </p:par>
+    </p:tnLst>
+  </p:timing>
+</p:sld>
+</file>
+
+<file path=ppt/slides/slide36.xml><?xml version="1.0" encoding="utf-8"?>
+<p:sld xmlns:a="http://schemas.openxmlformats.org/drawingml/2006/main" xmlns:r="http://schemas.openxmlformats.org/officeDocument/2006/relationships" xmlns:p="http://schemas.openxmlformats.org/presentationml/2006/main">
+  <p:cSld>
+    <p:spTree>
+      <p:nvGrpSpPr>
+        <p:cNvPr id="1" name=""/>
+        <p:cNvGrpSpPr/>
+        <p:nvPr/>
+      </p:nvGrpSpPr>
+      <p:grpSpPr>
+        <a:xfrm>
+          <a:off x="0" y="0"/>
+          <a:ext cx="0" cy="0"/>
+          <a:chOff x="0" y="0"/>
+          <a:chExt cx="0" cy="0"/>
+        </a:xfrm>
+      </p:grpSpPr>
+      <p:sp>
+        <p:nvSpPr>
+          <p:cNvPr id="2" name="Title 1"/>
+          <p:cNvSpPr>
+            <a:spLocks noGrp="1"/>
+          </p:cNvSpPr>
+          <p:nvPr>
+            <p:ph type="title"/>
+          </p:nvPr>
+        </p:nvSpPr>
+        <p:spPr/>
+        <p:txBody>
+          <a:bodyPr/>
+          <a:lstStyle/>
+          <a:p>
+            <a:r>
+              <a:rPr lang="en-CA" smtClean="0"/>
+              <a:t>Conclusion</a:t>
+            </a:r>
+            <a:endParaRPr lang="en-CA" dirty="0"/>
+          </a:p>
+        </p:txBody>
+      </p:sp>
+      <p:sp>
+        <p:nvSpPr>
+          <p:cNvPr id="3" name="Content Placeholder 2"/>
+          <p:cNvSpPr>
+            <a:spLocks noGrp="1"/>
+          </p:cNvSpPr>
+          <p:nvPr>
+            <p:ph idx="1"/>
+          </p:nvPr>
+        </p:nvSpPr>
+        <p:spPr/>
+        <p:txBody>
+          <a:bodyPr/>
+          <a:lstStyle/>
+          <a:p>
+            <a:r>
+              <a:rPr lang="en-CA" smtClean="0"/>
+              <a:t>Spiffy framework</a:t>
+            </a:r>
+          </a:p>
+          <a:p>
+            <a:pPr lvl="1"/>
+            <a:r>
+              <a:rPr lang="en-CA" smtClean="0"/>
+              <a:t>Annotation language for specifying file system format</a:t>
+            </a:r>
+          </a:p>
+          <a:p>
+            <a:pPr lvl="1"/>
+            <a:r>
+              <a:rPr lang="en-CA" smtClean="0"/>
+              <a:t>API for interpreting, and traversing file system metadata</a:t>
+            </a:r>
+          </a:p>
+          <a:p>
+            <a:pPr lvl="2"/>
+            <a:r>
+              <a:rPr lang="en-CA" smtClean="0"/>
+              <a:t>Simplifies development of file-system aware applications</a:t>
+            </a:r>
+          </a:p>
+          <a:p>
+            <a:pPr lvl="2"/>
+            <a:r>
+              <a:rPr lang="en-CA" smtClean="0"/>
+              <a:t>Reduces file-system specific code</a:t>
+            </a:r>
+          </a:p>
+          <a:p>
+            <a:pPr lvl="2"/>
+            <a:r>
+              <a:rPr lang="en-CA" smtClean="0"/>
+              <a:t>Enables code reuse across file systems</a:t>
+            </a:r>
+          </a:p>
+          <a:p>
+            <a:pPr lvl="1"/>
+            <a:r>
+              <a:rPr lang="en-CA" smtClean="0"/>
+              <a:t>Generated library from annotated data structures</a:t>
+            </a:r>
+          </a:p>
+          <a:p>
+            <a:pPr lvl="2"/>
+            <a:r>
+              <a:rPr lang="en-CA" smtClean="0"/>
+              <a:t>Robust against file system corruption</a:t>
+            </a:r>
+          </a:p>
+          <a:p>
+            <a:pPr lvl="2"/>
+            <a:r>
+              <a:rPr lang="en-CA" smtClean="0"/>
+              <a:t>Achieves good performance</a:t>
+            </a:r>
+          </a:p>
+          <a:p>
+            <a:endParaRPr lang="en-CA" smtClean="0"/>
+          </a:p>
+          <a:p>
+            <a:endParaRPr lang="en-CA" dirty="0"/>
+          </a:p>
+        </p:txBody>
+      </p:sp>
+      <p:sp>
+        <p:nvSpPr>
+          <p:cNvPr id="4" name="Slide Number Placeholder 3"/>
+          <p:cNvSpPr>
+            <a:spLocks noGrp="1"/>
+          </p:cNvSpPr>
+          <p:nvPr>
+            <p:ph type="sldNum" sz="quarter" idx="12"/>
+          </p:nvPr>
+        </p:nvSpPr>
+        <p:spPr/>
+        <p:txBody>
+          <a:bodyPr/>
+          <a:lstStyle/>
+          <a:p>
+            <a:fld id="{7B2023C8-B124-43A9-8F92-0EEF5BAA9995}" type="slidenum">
+              <a:rPr lang="en-CA" smtClean="0"/>
+              <a:pPr/>
+              <a:t>36</a:t>
+            </a:fld>
+            <a:endParaRPr lang="en-CA" dirty="0"/>
+          </a:p>
+        </p:txBody>
+      </p:sp>
+    </p:spTree>
+    <p:extLst>
+      <p:ext uri="{BB962C8B-B14F-4D97-AF65-F5344CB8AC3E}">
+        <p14:creationId xmlns:p14="http://schemas.microsoft.com/office/powerpoint/2010/main" val="169057136"/>
+      </p:ext>
+    </p:extLst>
+  </p:cSld>
+  <p:clrMapOvr>
+    <a:masterClrMapping/>
+  </p:clrMapOvr>
+  <p:timing>
+    <p:tnLst>
+      <p:par>
+        <p:cTn id="1" dur="indefinite" restart="never" nodeType="tmRoot"/>
+      </p:par>
+    </p:tnLst>
+  </p:timing>
+</p:sld>
+</file>
+
+<file path=ppt/slides/slide37.xml><?xml version="1.0" encoding="utf-8"?>
+<p:sld xmlns:a="http://schemas.openxmlformats.org/drawingml/2006/main" xmlns:r="http://schemas.openxmlformats.org/officeDocument/2006/relationships" xmlns:p="http://schemas.openxmlformats.org/presentationml/2006/main">
+  <p:cSld>
+    <p:spTree>
+      <p:nvGrpSpPr>
+        <p:cNvPr id="1" name=""/>
+        <p:cNvGrpSpPr/>
+        <p:nvPr/>
+      </p:nvGrpSpPr>
+      <p:grpSpPr>
+        <a:xfrm>
+          <a:off x="0" y="0"/>
+          <a:ext cx="0" cy="0"/>
+          <a:chOff x="0" y="0"/>
+          <a:chExt cx="0" cy="0"/>
+        </a:xfrm>
+      </p:grpSpPr>
+      <p:sp>
+        <p:nvSpPr>
+          <p:cNvPr id="2" name="Title 1"/>
+          <p:cNvSpPr>
+            <a:spLocks noGrp="1"/>
+          </p:cNvSpPr>
+          <p:nvPr>
+            <p:ph type="title"/>
+          </p:nvPr>
+        </p:nvSpPr>
+        <p:spPr/>
+        <p:txBody>
+          <a:bodyPr/>
+          <a:lstStyle/>
+          <a:p>
+            <a:r>
+              <a:rPr lang="en-CA" smtClean="0"/>
+              <a:t>Evaluation: Programming Effort</a:t>
+            </a:r>
+            <a:endParaRPr lang="en-CA" dirty="0"/>
+          </a:p>
+        </p:txBody>
+      </p:sp>
+      <p:sp>
+        <p:nvSpPr>
+          <p:cNvPr id="3" name="Content Placeholder 2"/>
+          <p:cNvSpPr>
+            <a:spLocks noGrp="1"/>
+          </p:cNvSpPr>
+          <p:nvPr>
+            <p:ph idx="1"/>
+          </p:nvPr>
+        </p:nvSpPr>
+        <p:spPr/>
+        <p:txBody>
+          <a:bodyPr/>
+          <a:lstStyle/>
+          <a:p>
+            <a:endParaRPr lang="en-CA" smtClean="0"/>
+          </a:p>
+          <a:p>
+            <a:endParaRPr lang="en-CA" smtClean="0"/>
+          </a:p>
+          <a:p>
+            <a:endParaRPr lang="en-CA" smtClean="0"/>
+          </a:p>
+          <a:p>
+            <a:endParaRPr lang="en-CA" smtClean="0"/>
+          </a:p>
+          <a:p>
+            <a:endParaRPr lang="en-CA" smtClean="0"/>
+          </a:p>
+          <a:p>
+            <a:endParaRPr lang="en-CA" smtClean="0"/>
+          </a:p>
+          <a:p>
+            <a:endParaRPr lang="en-CA" smtClean="0"/>
+          </a:p>
+          <a:p>
+            <a:r>
+              <a:rPr lang="en-CA" smtClean="0"/>
+              <a:t>Programming effort reduced for read-only file system applications</a:t>
+            </a:r>
+          </a:p>
+          <a:p>
+            <a:pPr lvl="1"/>
+            <a:r>
+              <a:rPr lang="en-CA" smtClean="0"/>
+              <a:t>Both online and offline</a:t>
+            </a:r>
+            <a:endParaRPr lang="en-CA" dirty="0"/>
+          </a:p>
+        </p:txBody>
+      </p:sp>
+      <p:sp>
+        <p:nvSpPr>
+          <p:cNvPr id="6" name="Slide Number Placeholder 5"/>
+          <p:cNvSpPr>
+            <a:spLocks noGrp="1"/>
+          </p:cNvSpPr>
+          <p:nvPr>
+            <p:ph type="sldNum" sz="quarter" idx="12"/>
+          </p:nvPr>
+        </p:nvSpPr>
+        <p:spPr/>
+        <p:txBody>
+          <a:bodyPr/>
+          <a:lstStyle/>
+          <a:p>
+            <a:fld id="{7B2023C8-B124-43A9-8F92-0EEF5BAA9995}" type="slidenum">
+              <a:rPr lang="en-CA" smtClean="0"/>
+              <a:pPr/>
+              <a:t>37</a:t>
             </a:fld>
             <a:endParaRPr lang="en-CA" dirty="0"/>
           </a:p>
@@ -34048,21 +34323,21 @@
                 <a:gridCol w="3593986">
                   <a:extLst>
                     <a:ext uri="{9D8B030D-6E8A-4147-A177-3AD203B41FA5}">
-                      <a16:colId xmlns:a16="http://schemas.microsoft.com/office/drawing/2014/main" xmlns="" val="20000"/>
+                      <a16:colId xmlns="" xmlns:a16="http://schemas.microsoft.com/office/drawing/2014/main" val="20000"/>
                     </a:ext>
                   </a:extLst>
                 </a:gridCol>
                 <a:gridCol w="2017336">
                   <a:extLst>
                     <a:ext uri="{9D8B030D-6E8A-4147-A177-3AD203B41FA5}">
-                      <a16:colId xmlns:a16="http://schemas.microsoft.com/office/drawing/2014/main" xmlns="" val="20001"/>
+                      <a16:colId xmlns="" xmlns:a16="http://schemas.microsoft.com/office/drawing/2014/main" val="20001"/>
                     </a:ext>
                   </a:extLst>
                 </a:gridCol>
                 <a:gridCol w="3289955">
                   <a:extLst>
                     <a:ext uri="{9D8B030D-6E8A-4147-A177-3AD203B41FA5}">
-                      <a16:colId xmlns:a16="http://schemas.microsoft.com/office/drawing/2014/main" xmlns="" val="20002"/>
+                      <a16:colId xmlns="" xmlns:a16="http://schemas.microsoft.com/office/drawing/2014/main" val="20002"/>
                     </a:ext>
                   </a:extLst>
                 </a:gridCol>
@@ -34152,7 +34427,7 @@
                 </a:tc>
                 <a:extLst>
                   <a:ext uri="{0D108BD9-81ED-4DB2-BD59-A6C34878D82A}">
-                    <a16:rowId xmlns:a16="http://schemas.microsoft.com/office/drawing/2014/main" xmlns="" val="10000"/>
+                    <a16:rowId xmlns="" xmlns:a16="http://schemas.microsoft.com/office/drawing/2014/main" val="10000"/>
                   </a:ext>
                 </a:extLst>
               </a:tr>
@@ -34225,7 +34500,7 @@
                 </a:tc>
                 <a:extLst>
                   <a:ext uri="{0D108BD9-81ED-4DB2-BD59-A6C34878D82A}">
-                    <a16:rowId xmlns:a16="http://schemas.microsoft.com/office/drawing/2014/main" xmlns="" val="10001"/>
+                    <a16:rowId xmlns="" xmlns:a16="http://schemas.microsoft.com/office/drawing/2014/main" val="10001"/>
                   </a:ext>
                 </a:extLst>
               </a:tr>
@@ -34306,7 +34581,7 @@
                 </a:tc>
                 <a:extLst>
                   <a:ext uri="{0D108BD9-81ED-4DB2-BD59-A6C34878D82A}">
-                    <a16:rowId xmlns:a16="http://schemas.microsoft.com/office/drawing/2014/main" xmlns="" val="10002"/>
+                    <a16:rowId xmlns="" xmlns:a16="http://schemas.microsoft.com/office/drawing/2014/main" val="10002"/>
                   </a:ext>
                 </a:extLst>
               </a:tr>
@@ -34387,7 +34662,7 @@
                 </a:tc>
                 <a:extLst>
                   <a:ext uri="{0D108BD9-81ED-4DB2-BD59-A6C34878D82A}">
-                    <a16:rowId xmlns:a16="http://schemas.microsoft.com/office/drawing/2014/main" xmlns="" val="10003"/>
+                    <a16:rowId xmlns="" xmlns:a16="http://schemas.microsoft.com/office/drawing/2014/main" val="10003"/>
                   </a:ext>
                 </a:extLst>
               </a:tr>
@@ -34484,7 +34759,7 @@
                 </a:tc>
                 <a:extLst>
                   <a:ext uri="{0D108BD9-81ED-4DB2-BD59-A6C34878D82A}">
-                    <a16:rowId xmlns:a16="http://schemas.microsoft.com/office/drawing/2014/main" xmlns="" val="10004"/>
+                    <a16:rowId xmlns="" xmlns:a16="http://schemas.microsoft.com/office/drawing/2014/main" val="10004"/>
                   </a:ext>
                 </a:extLst>
               </a:tr>
@@ -34589,7 +34864,7 @@
                 </a:tc>
                 <a:extLst>
                   <a:ext uri="{0D108BD9-81ED-4DB2-BD59-A6C34878D82A}">
-                    <a16:rowId xmlns:a16="http://schemas.microsoft.com/office/drawing/2014/main" xmlns="" val="10005"/>
+                    <a16:rowId xmlns="" xmlns:a16="http://schemas.microsoft.com/office/drawing/2014/main" val="10005"/>
                   </a:ext>
                 </a:extLst>
               </a:tr>
@@ -34654,7 +34929,7 @@
                 </a:tc>
                 <a:extLst>
                   <a:ext uri="{0D108BD9-81ED-4DB2-BD59-A6C34878D82A}">
-                    <a16:rowId xmlns:a16="http://schemas.microsoft.com/office/drawing/2014/main" xmlns="" val="10006"/>
+                    <a16:rowId xmlns="" xmlns:a16="http://schemas.microsoft.com/office/drawing/2014/main" val="10006"/>
                   </a:ext>
                 </a:extLst>
               </a:tr>
@@ -34739,7 +35014,7 @@
                 </a:tc>
                 <a:extLst>
                   <a:ext uri="{0D108BD9-81ED-4DB2-BD59-A6C34878D82A}">
-                    <a16:rowId xmlns:a16="http://schemas.microsoft.com/office/drawing/2014/main" xmlns="" val="10007"/>
+                    <a16:rowId xmlns="" xmlns:a16="http://schemas.microsoft.com/office/drawing/2014/main" val="10007"/>
                   </a:ext>
                 </a:extLst>
               </a:tr>
@@ -34837,7 +35112,7 @@
                 </a:tc>
                 <a:extLst>
                   <a:ext uri="{0D108BD9-81ED-4DB2-BD59-A6C34878D82A}">
-                    <a16:rowId xmlns:a16="http://schemas.microsoft.com/office/drawing/2014/main" xmlns="" val="10008"/>
+                    <a16:rowId xmlns="" xmlns:a16="http://schemas.microsoft.com/office/drawing/2014/main" val="10008"/>
                   </a:ext>
                 </a:extLst>
               </a:tr>
@@ -34865,7 +35140,7 @@
 </p:sld>
 </file>
 
-<file path=ppt/slides/slide35.xml><?xml version="1.0" encoding="utf-8"?>
+<file path=ppt/slides/slide38.xml><?xml version="1.0" encoding="utf-8"?>
 <p:sld xmlns:a="http://schemas.openxmlformats.org/drawingml/2006/main" xmlns:r="http://schemas.openxmlformats.org/officeDocument/2006/relationships" xmlns:p="http://schemas.openxmlformats.org/presentationml/2006/main">
   <p:cSld>
     <p:spTree>
@@ -34973,7 +35248,7 @@
             <a:fld id="{7B2023C8-B124-43A9-8F92-0EEF5BAA9995}" type="slidenum">
               <a:rPr lang="en-CA" smtClean="0"/>
               <a:pPr/>
-              <a:t>35</a:t>
+              <a:t>38</a:t>
             </a:fld>
             <a:endParaRPr lang="en-CA" dirty="0"/>
           </a:p>
@@ -35007,28 +35282,28 @@
                 <a:gridCol w="1173256">
                   <a:extLst>
                     <a:ext uri="{9D8B030D-6E8A-4147-A177-3AD203B41FA5}">
-                      <a16:colId xmlns:a16="http://schemas.microsoft.com/office/drawing/2014/main" xmlns="" val="20000"/>
+                      <a16:colId xmlns="" xmlns:a16="http://schemas.microsoft.com/office/drawing/2014/main" val="20000"/>
                     </a:ext>
                   </a:extLst>
                 </a:gridCol>
                 <a:gridCol w="1357460">
                   <a:extLst>
                     <a:ext uri="{9D8B030D-6E8A-4147-A177-3AD203B41FA5}">
-                      <a16:colId xmlns:a16="http://schemas.microsoft.com/office/drawing/2014/main" xmlns="" val="20001"/>
+                      <a16:colId xmlns="" xmlns:a16="http://schemas.microsoft.com/office/drawing/2014/main" val="20001"/>
                     </a:ext>
                   </a:extLst>
                 </a:gridCol>
                 <a:gridCol w="2375554">
                   <a:extLst>
                     <a:ext uri="{9D8B030D-6E8A-4147-A177-3AD203B41FA5}">
-                      <a16:colId xmlns:a16="http://schemas.microsoft.com/office/drawing/2014/main" xmlns="" val="20002"/>
+                      <a16:colId xmlns="" xmlns:a16="http://schemas.microsoft.com/office/drawing/2014/main" val="20002"/>
                     </a:ext>
                   </a:extLst>
                 </a:gridCol>
                 <a:gridCol w="5165889">
                   <a:extLst>
                     <a:ext uri="{9D8B030D-6E8A-4147-A177-3AD203B41FA5}">
-                      <a16:colId xmlns:a16="http://schemas.microsoft.com/office/drawing/2014/main" xmlns="" val="20003"/>
+                      <a16:colId xmlns="" xmlns:a16="http://schemas.microsoft.com/office/drawing/2014/main" val="20003"/>
                     </a:ext>
                   </a:extLst>
                 </a:gridCol>
@@ -35124,7 +35399,7 @@
                 </a:tc>
                 <a:extLst>
                   <a:ext uri="{0D108BD9-81ED-4DB2-BD59-A6C34878D82A}">
-                    <a16:rowId xmlns:a16="http://schemas.microsoft.com/office/drawing/2014/main" xmlns="" val="10000"/>
+                    <a16:rowId xmlns="" xmlns:a16="http://schemas.microsoft.com/office/drawing/2014/main" val="10000"/>
                   </a:ext>
                 </a:extLst>
               </a:tr>
@@ -35225,7 +35500,7 @@
                 </a:tc>
                 <a:extLst>
                   <a:ext uri="{0D108BD9-81ED-4DB2-BD59-A6C34878D82A}">
-                    <a16:rowId xmlns:a16="http://schemas.microsoft.com/office/drawing/2014/main" xmlns="" val="10001"/>
+                    <a16:rowId xmlns="" xmlns:a16="http://schemas.microsoft.com/office/drawing/2014/main" val="10001"/>
                   </a:ext>
                 </a:extLst>
               </a:tr>
@@ -35359,7 +35634,7 @@
                 </a:tc>
                 <a:extLst>
                   <a:ext uri="{0D108BD9-81ED-4DB2-BD59-A6C34878D82A}">
-                    <a16:rowId xmlns:a16="http://schemas.microsoft.com/office/drawing/2014/main" xmlns="" val="10002"/>
+                    <a16:rowId xmlns="" xmlns:a16="http://schemas.microsoft.com/office/drawing/2014/main" val="10002"/>
                   </a:ext>
                 </a:extLst>
               </a:tr>
@@ -35501,7 +35776,7 @@
                 </a:tc>
                 <a:extLst>
                   <a:ext uri="{0D108BD9-81ED-4DB2-BD59-A6C34878D82A}">
-                    <a16:rowId xmlns:a16="http://schemas.microsoft.com/office/drawing/2014/main" xmlns="" val="10003"/>
+                    <a16:rowId xmlns="" xmlns:a16="http://schemas.microsoft.com/office/drawing/2014/main" val="10003"/>
                   </a:ext>
                 </a:extLst>
               </a:tr>
@@ -35614,7 +35889,7 @@
                 </a:tc>
                 <a:extLst>
                   <a:ext uri="{0D108BD9-81ED-4DB2-BD59-A6C34878D82A}">
-                    <a16:rowId xmlns:a16="http://schemas.microsoft.com/office/drawing/2014/main" xmlns="" val="10004"/>
+                    <a16:rowId xmlns="" xmlns:a16="http://schemas.microsoft.com/office/drawing/2014/main" val="10004"/>
                   </a:ext>
                 </a:extLst>
               </a:tr>
@@ -35740,7 +36015,7 @@
                 </a:tc>
                 <a:extLst>
                   <a:ext uri="{0D108BD9-81ED-4DB2-BD59-A6C34878D82A}">
-                    <a16:rowId xmlns:a16="http://schemas.microsoft.com/office/drawing/2014/main" xmlns="" val="10005"/>
+                    <a16:rowId xmlns="" xmlns:a16="http://schemas.microsoft.com/office/drawing/2014/main" val="10005"/>
                   </a:ext>
                 </a:extLst>
               </a:tr>
@@ -35898,7 +36173,7 @@
                 </a:tc>
                 <a:extLst>
                   <a:ext uri="{0D108BD9-81ED-4DB2-BD59-A6C34878D82A}">
-                    <a16:rowId xmlns:a16="http://schemas.microsoft.com/office/drawing/2014/main" xmlns="" val="10006"/>
+                    <a16:rowId xmlns="" xmlns:a16="http://schemas.microsoft.com/office/drawing/2014/main" val="10006"/>
                   </a:ext>
                 </a:extLst>
               </a:tr>
@@ -35926,7 +36201,7 @@
 </p:sld>
 </file>
 
-<file path=ppt/slides/slide36.xml><?xml version="1.0" encoding="utf-8"?>
+<file path=ppt/slides/slide39.xml><?xml version="1.0" encoding="utf-8"?>
 <p:sld xmlns:a="http://schemas.openxmlformats.org/drawingml/2006/main" xmlns:r="http://schemas.openxmlformats.org/officeDocument/2006/relationships" xmlns:p="http://schemas.openxmlformats.org/presentationml/2006/main">
   <p:cSld>
     <p:spTree>
@@ -36036,7 +36311,7 @@
             <a:fld id="{7B2023C8-B124-43A9-8F92-0EEF5BAA9995}" type="slidenum">
               <a:rPr lang="en-CA" smtClean="0"/>
               <a:pPr/>
-              <a:t>36</a:t>
+              <a:t>39</a:t>
             </a:fld>
             <a:endParaRPr lang="en-CA" dirty="0"/>
           </a:p>

</xml_diff>